<commit_message>
Small updates on Design.pptx
</commit_message>
<xml_diff>
--- a/Design.pptx
+++ b/Design.pptx
@@ -295,7 +295,7 @@
           <a:p>
             <a:fld id="{16D45444-3A16-465C-AD6C-0FB678B44574}" type="datetimeFigureOut">
               <a:rPr lang="en-GB" smtClean="0"/>
-              <a:t>18.9.20</a:t>
+              <a:t>12/12/2020</a:t>
             </a:fld>
             <a:endParaRPr lang="en-GB"/>
           </a:p>
@@ -465,7 +465,7 @@
           <a:p>
             <a:fld id="{16D45444-3A16-465C-AD6C-0FB678B44574}" type="datetimeFigureOut">
               <a:rPr lang="en-GB" smtClean="0"/>
-              <a:t>18.9.20</a:t>
+              <a:t>12/12/2020</a:t>
             </a:fld>
             <a:endParaRPr lang="en-GB"/>
           </a:p>
@@ -645,7 +645,7 @@
           <a:p>
             <a:fld id="{16D45444-3A16-465C-AD6C-0FB678B44574}" type="datetimeFigureOut">
               <a:rPr lang="en-GB" smtClean="0"/>
-              <a:t>18.9.20</a:t>
+              <a:t>12/12/2020</a:t>
             </a:fld>
             <a:endParaRPr lang="en-GB"/>
           </a:p>
@@ -815,7 +815,7 @@
           <a:p>
             <a:fld id="{16D45444-3A16-465C-AD6C-0FB678B44574}" type="datetimeFigureOut">
               <a:rPr lang="en-GB" smtClean="0"/>
-              <a:t>18.9.20</a:t>
+              <a:t>12/12/2020</a:t>
             </a:fld>
             <a:endParaRPr lang="en-GB"/>
           </a:p>
@@ -1061,7 +1061,7 @@
           <a:p>
             <a:fld id="{16D45444-3A16-465C-AD6C-0FB678B44574}" type="datetimeFigureOut">
               <a:rPr lang="en-GB" smtClean="0"/>
-              <a:t>18.9.20</a:t>
+              <a:t>12/12/2020</a:t>
             </a:fld>
             <a:endParaRPr lang="en-GB"/>
           </a:p>
@@ -1349,7 +1349,7 @@
           <a:p>
             <a:fld id="{16D45444-3A16-465C-AD6C-0FB678B44574}" type="datetimeFigureOut">
               <a:rPr lang="en-GB" smtClean="0"/>
-              <a:t>18.9.20</a:t>
+              <a:t>12/12/2020</a:t>
             </a:fld>
             <a:endParaRPr lang="en-GB"/>
           </a:p>
@@ -1771,7 +1771,7 @@
           <a:p>
             <a:fld id="{16D45444-3A16-465C-AD6C-0FB678B44574}" type="datetimeFigureOut">
               <a:rPr lang="en-GB" smtClean="0"/>
-              <a:t>18.9.20</a:t>
+              <a:t>12/12/2020</a:t>
             </a:fld>
             <a:endParaRPr lang="en-GB"/>
           </a:p>
@@ -1889,7 +1889,7 @@
           <a:p>
             <a:fld id="{16D45444-3A16-465C-AD6C-0FB678B44574}" type="datetimeFigureOut">
               <a:rPr lang="en-GB" smtClean="0"/>
-              <a:t>18.9.20</a:t>
+              <a:t>12/12/2020</a:t>
             </a:fld>
             <a:endParaRPr lang="en-GB"/>
           </a:p>
@@ -1984,7 +1984,7 @@
           <a:p>
             <a:fld id="{16D45444-3A16-465C-AD6C-0FB678B44574}" type="datetimeFigureOut">
               <a:rPr lang="en-GB" smtClean="0"/>
-              <a:t>18.9.20</a:t>
+              <a:t>12/12/2020</a:t>
             </a:fld>
             <a:endParaRPr lang="en-GB"/>
           </a:p>
@@ -2261,7 +2261,7 @@
           <a:p>
             <a:fld id="{16D45444-3A16-465C-AD6C-0FB678B44574}" type="datetimeFigureOut">
               <a:rPr lang="en-GB" smtClean="0"/>
-              <a:t>18.9.20</a:t>
+              <a:t>12/12/2020</a:t>
             </a:fld>
             <a:endParaRPr lang="en-GB"/>
           </a:p>
@@ -2514,7 +2514,7 @@
           <a:p>
             <a:fld id="{16D45444-3A16-465C-AD6C-0FB678B44574}" type="datetimeFigureOut">
               <a:rPr lang="en-GB" smtClean="0"/>
-              <a:t>18.9.20</a:t>
+              <a:t>12/12/2020</a:t>
             </a:fld>
             <a:endParaRPr lang="en-GB"/>
           </a:p>
@@ -2727,7 +2727,7 @@
           <a:p>
             <a:fld id="{16D45444-3A16-465C-AD6C-0FB678B44574}" type="datetimeFigureOut">
               <a:rPr lang="en-GB" smtClean="0"/>
-              <a:t>18.9.20</a:t>
+              <a:t>12/12/2020</a:t>
             </a:fld>
             <a:endParaRPr lang="en-GB"/>
           </a:p>
@@ -3465,7 +3465,23 @@
           <a:p>
             <a:r>
               <a:rPr lang="en-GB" sz="800" dirty="0" smtClean="0"/>
-              <a:t>A relationship between 2 classes defines one as child and the other as parent. Each child property points to 0 or 1 parent, while a parent can have 0 to many children (one to many relationship,  1:mc or 1c:mc).</a:t>
+              <a:t>A relationship between 2 classes defines one as child and the other as parent. Each child property points to 0 or 1 parent, while a parent can have 0 to many children </a:t>
+            </a:r>
+            <a:r>
+              <a:rPr lang="en-GB" sz="800" dirty="0" smtClean="0"/>
+              <a:t>(one to </a:t>
+            </a:r>
+            <a:r>
+              <a:rPr lang="en-GB" sz="800" dirty="0" smtClean="0"/>
+              <a:t>many relationship,  </a:t>
+            </a:r>
+            <a:r>
+              <a:rPr lang="en-GB" sz="800" dirty="0" smtClean="0"/>
+              <a:t>1:mc </a:t>
+            </a:r>
+            <a:r>
+              <a:rPr lang="en-GB" sz="800" dirty="0" smtClean="0"/>
+              <a:t>or 1c:mc).</a:t>
             </a:r>
           </a:p>
           <a:p>
@@ -6877,7 +6893,15 @@
             </a:r>
             <a:r>
               <a:rPr lang="en-GB" sz="800" dirty="0" smtClean="0"/>
-              <a:t>, the oldest generation (A) gets read first from its file. Only then the next generation  gets read (B and then C and D). While reading that second generation, if the child (B, C, D) can find its Parent (A), it gets added in the parent to the correct children collection. If the parent is missing, an Exception is thrown. If A could be a child of E, it would no longer be possible to decide who is the oldest generation.</a:t>
+              <a:t>, the oldest generation (A) gets read first from its file. Only then the next generation  gets read (</a:t>
+            </a:r>
+            <a:r>
+              <a:rPr lang="en-GB" sz="800" dirty="0" smtClean="0"/>
+              <a:t>B, C </a:t>
+            </a:r>
+            <a:r>
+              <a:rPr lang="en-GB" sz="800" dirty="0" smtClean="0"/>
+              <a:t>and D). While reading that second generation, if the child (B, C, D) can find its Parent (A), it gets added in the parent to the correct children collection. If the parent is missing, an Exception is thrown. If A could be a child of E, it would no longer be possible to decide who is the oldest generation.</a:t>
             </a:r>
             <a:endParaRPr lang="en-GB" sz="800" dirty="0"/>
           </a:p>
@@ -7695,7 +7719,7 @@
         </p:nvSpPr>
         <p:spPr>
           <a:xfrm>
-            <a:off x="323528" y="2571750"/>
+            <a:off x="323528" y="2988697"/>
             <a:ext cx="8640960" cy="2031325"/>
           </a:xfrm>
           <a:prstGeom prst="rect">
@@ -7711,13 +7735,8 @@
           <a:p>
             <a:r>
               <a:rPr lang="en-GB" dirty="0" smtClean="0"/>
-              <a:t>Unfortunately, there are to many strange cases to be solved, when a not stored child can be added to a not stored parent, for example if the child belongs to 2 parents. If it has only 1 parent, the child could get saved when the parent gets saved. But when it has 2 parents and the first parent tries to save the child before the second parent is saved, that wouldn’t work, because parent 2 has to be saved before child 2 can get saved, which needs to know </a:t>
-            </a:r>
-            <a:r>
-              <a:rPr lang="en-GB" smtClean="0"/>
-              <a:t>the key of parent 2.</a:t>
-            </a:r>
-            <a:endParaRPr lang="en-GB" dirty="0" smtClean="0"/>
+              <a:t>Unfortunately, there are to many strange cases to be solved, when a not stored child can be added to a not stored parent, for example if the child belongs to 2 parents. If it has only 1 parent, the child could get saved when the parent gets saved. But when it has 2 parents and the first parent tries to save the child before the second parent is saved, that wouldn’t work, because parent 2 has to be saved before child 2 can get saved, which needs to know the key of parent 2.</a:t>
+            </a:r>
           </a:p>
           <a:p>
             <a:endParaRPr lang="en-GB" dirty="0"/>
@@ -8784,621 +8803,6 @@
       </p:sp>
       <p:grpSp>
         <p:nvGrpSpPr>
-          <p:cNvPr id="56" name="Group 55"/>
-          <p:cNvGrpSpPr/>
-          <p:nvPr/>
-        </p:nvGrpSpPr>
-        <p:grpSpPr>
-          <a:xfrm>
-            <a:off x="9396536" y="375203"/>
-            <a:ext cx="846450" cy="3654978"/>
-            <a:chOff x="-684584" y="932996"/>
-            <a:chExt cx="846450" cy="3654978"/>
-          </a:xfrm>
-        </p:grpSpPr>
-        <p:sp>
-          <p:nvSpPr>
-            <p:cNvPr id="57" name="TextBox 56"/>
-            <p:cNvSpPr txBox="1"/>
-            <p:nvPr/>
-          </p:nvSpPr>
-          <p:spPr>
-            <a:xfrm>
-              <a:off x="-684584" y="932996"/>
-              <a:ext cx="846450" cy="276999"/>
-            </a:xfrm>
-            <a:prstGeom prst="rect">
-              <a:avLst/>
-            </a:prstGeom>
-            <a:noFill/>
-          </p:spPr>
-          <p:txBody>
-            <a:bodyPr wrap="none" rtlCol="0">
-              <a:spAutoFit/>
-            </a:bodyPr>
-            <a:lstStyle/>
-            <a:p>
-              <a:r>
-                <a:rPr lang="en-GB" sz="1200" b="1" dirty="0" smtClean="0"/>
-                <a:t>Properties</a:t>
-              </a:r>
-              <a:endParaRPr lang="en-GB" sz="1200" b="1" dirty="0"/>
-            </a:p>
-          </p:txBody>
-        </p:sp>
-        <p:sp>
-          <p:nvSpPr>
-            <p:cNvPr id="58" name="TextBox 57"/>
-            <p:cNvSpPr txBox="1"/>
-            <p:nvPr/>
-          </p:nvSpPr>
-          <p:spPr>
-            <a:xfrm>
-              <a:off x="-684584" y="1110784"/>
-              <a:ext cx="406971" cy="276999"/>
-            </a:xfrm>
-            <a:prstGeom prst="rect">
-              <a:avLst/>
-            </a:prstGeom>
-            <a:noFill/>
-          </p:spPr>
-          <p:txBody>
-            <a:bodyPr wrap="none" rtlCol="0">
-              <a:spAutoFit/>
-            </a:bodyPr>
-            <a:lstStyle/>
-            <a:p>
-              <a:r>
-                <a:rPr lang="en-GB" sz="1200" dirty="0" err="1"/>
-                <a:t>aaa</a:t>
-              </a:r>
-              <a:endParaRPr lang="en-GB" sz="1200" dirty="0"/>
-            </a:p>
-          </p:txBody>
-        </p:sp>
-        <p:sp>
-          <p:nvSpPr>
-            <p:cNvPr id="59" name="TextBox 58"/>
-            <p:cNvSpPr txBox="1"/>
-            <p:nvPr/>
-          </p:nvSpPr>
-          <p:spPr>
-            <a:xfrm>
-              <a:off x="-684584" y="1288572"/>
-              <a:ext cx="405880" cy="276999"/>
-            </a:xfrm>
-            <a:prstGeom prst="rect">
-              <a:avLst/>
-            </a:prstGeom>
-            <a:noFill/>
-          </p:spPr>
-          <p:txBody>
-            <a:bodyPr wrap="none" rtlCol="0">
-              <a:spAutoFit/>
-            </a:bodyPr>
-            <a:lstStyle/>
-            <a:p>
-              <a:r>
-                <a:rPr lang="en-GB" sz="1200" dirty="0" err="1"/>
-                <a:t>aaa</a:t>
-              </a:r>
-              <a:endParaRPr lang="en-GB" sz="1200" dirty="0"/>
-            </a:p>
-          </p:txBody>
-        </p:sp>
-        <p:sp>
-          <p:nvSpPr>
-            <p:cNvPr id="60" name="TextBox 59"/>
-            <p:cNvSpPr txBox="1"/>
-            <p:nvPr/>
-          </p:nvSpPr>
-          <p:spPr>
-            <a:xfrm>
-              <a:off x="-684584" y="1466360"/>
-              <a:ext cx="405880" cy="276999"/>
-            </a:xfrm>
-            <a:prstGeom prst="rect">
-              <a:avLst/>
-            </a:prstGeom>
-            <a:noFill/>
-          </p:spPr>
-          <p:txBody>
-            <a:bodyPr wrap="none" rtlCol="0">
-              <a:spAutoFit/>
-            </a:bodyPr>
-            <a:lstStyle/>
-            <a:p>
-              <a:r>
-                <a:rPr lang="en-GB" sz="1200" dirty="0" err="1"/>
-                <a:t>aaa</a:t>
-              </a:r>
-              <a:endParaRPr lang="en-GB" sz="1200" b="1" dirty="0"/>
-            </a:p>
-          </p:txBody>
-        </p:sp>
-        <p:sp>
-          <p:nvSpPr>
-            <p:cNvPr id="61" name="TextBox 60"/>
-            <p:cNvSpPr txBox="1"/>
-            <p:nvPr/>
-          </p:nvSpPr>
-          <p:spPr>
-            <a:xfrm>
-              <a:off x="-684584" y="1644148"/>
-              <a:ext cx="405880" cy="276999"/>
-            </a:xfrm>
-            <a:prstGeom prst="rect">
-              <a:avLst/>
-            </a:prstGeom>
-            <a:noFill/>
-          </p:spPr>
-          <p:txBody>
-            <a:bodyPr wrap="none" rtlCol="0">
-              <a:spAutoFit/>
-            </a:bodyPr>
-            <a:lstStyle/>
-            <a:p>
-              <a:r>
-                <a:rPr lang="en-GB" sz="1200" dirty="0" err="1"/>
-                <a:t>aaa</a:t>
-              </a:r>
-              <a:endParaRPr lang="en-GB" sz="1200" dirty="0"/>
-            </a:p>
-          </p:txBody>
-        </p:sp>
-        <p:sp>
-          <p:nvSpPr>
-            <p:cNvPr id="62" name="TextBox 61"/>
-            <p:cNvSpPr txBox="1"/>
-            <p:nvPr/>
-          </p:nvSpPr>
-          <p:spPr>
-            <a:xfrm>
-              <a:off x="-684584" y="1821936"/>
-              <a:ext cx="405880" cy="276999"/>
-            </a:xfrm>
-            <a:prstGeom prst="rect">
-              <a:avLst/>
-            </a:prstGeom>
-            <a:noFill/>
-          </p:spPr>
-          <p:txBody>
-            <a:bodyPr wrap="none" rtlCol="0">
-              <a:spAutoFit/>
-            </a:bodyPr>
-            <a:lstStyle/>
-            <a:p>
-              <a:r>
-                <a:rPr lang="en-GB" sz="1200" dirty="0" err="1"/>
-                <a:t>aaa</a:t>
-              </a:r>
-              <a:endParaRPr lang="en-GB" sz="1200" b="1" dirty="0"/>
-            </a:p>
-          </p:txBody>
-        </p:sp>
-        <p:sp>
-          <p:nvSpPr>
-            <p:cNvPr id="63" name="TextBox 62"/>
-            <p:cNvSpPr txBox="1"/>
-            <p:nvPr/>
-          </p:nvSpPr>
-          <p:spPr>
-            <a:xfrm>
-              <a:off x="-684584" y="1999724"/>
-              <a:ext cx="405880" cy="276999"/>
-            </a:xfrm>
-            <a:prstGeom prst="rect">
-              <a:avLst/>
-            </a:prstGeom>
-            <a:noFill/>
-          </p:spPr>
-          <p:txBody>
-            <a:bodyPr wrap="none" rtlCol="0">
-              <a:spAutoFit/>
-            </a:bodyPr>
-            <a:lstStyle/>
-            <a:p>
-              <a:r>
-                <a:rPr lang="en-GB" sz="1200" dirty="0" err="1" smtClean="0"/>
-                <a:t>aaa</a:t>
-              </a:r>
-              <a:endParaRPr lang="en-GB" sz="1200" dirty="0"/>
-            </a:p>
-          </p:txBody>
-        </p:sp>
-        <p:sp>
-          <p:nvSpPr>
-            <p:cNvPr id="64" name="TextBox 63"/>
-            <p:cNvSpPr txBox="1"/>
-            <p:nvPr/>
-          </p:nvSpPr>
-          <p:spPr>
-            <a:xfrm>
-              <a:off x="-684584" y="2177512"/>
-              <a:ext cx="405880" cy="276999"/>
-            </a:xfrm>
-            <a:prstGeom prst="rect">
-              <a:avLst/>
-            </a:prstGeom>
-            <a:noFill/>
-          </p:spPr>
-          <p:txBody>
-            <a:bodyPr wrap="none" rtlCol="0">
-              <a:spAutoFit/>
-            </a:bodyPr>
-            <a:lstStyle/>
-            <a:p>
-              <a:r>
-                <a:rPr lang="en-GB" sz="1200" dirty="0" err="1" smtClean="0"/>
-                <a:t>aaa</a:t>
-              </a:r>
-              <a:endParaRPr lang="en-GB" sz="1200" dirty="0"/>
-            </a:p>
-          </p:txBody>
-        </p:sp>
-        <p:sp>
-          <p:nvSpPr>
-            <p:cNvPr id="65" name="TextBox 64"/>
-            <p:cNvSpPr txBox="1"/>
-            <p:nvPr/>
-          </p:nvSpPr>
-          <p:spPr>
-            <a:xfrm>
-              <a:off x="-684584" y="2355300"/>
-              <a:ext cx="405880" cy="276999"/>
-            </a:xfrm>
-            <a:prstGeom prst="rect">
-              <a:avLst/>
-            </a:prstGeom>
-            <a:noFill/>
-          </p:spPr>
-          <p:txBody>
-            <a:bodyPr wrap="none" rtlCol="0">
-              <a:spAutoFit/>
-            </a:bodyPr>
-            <a:lstStyle/>
-            <a:p>
-              <a:r>
-                <a:rPr lang="en-GB" sz="1200" dirty="0" err="1" smtClean="0"/>
-                <a:t>aaa</a:t>
-              </a:r>
-              <a:endParaRPr lang="en-GB" sz="1200" dirty="0"/>
-            </a:p>
-          </p:txBody>
-        </p:sp>
-        <p:sp>
-          <p:nvSpPr>
-            <p:cNvPr id="66" name="TextBox 65"/>
-            <p:cNvSpPr txBox="1"/>
-            <p:nvPr/>
-          </p:nvSpPr>
-          <p:spPr>
-            <a:xfrm>
-              <a:off x="-684584" y="2533088"/>
-              <a:ext cx="405880" cy="276999"/>
-            </a:xfrm>
-            <a:prstGeom prst="rect">
-              <a:avLst/>
-            </a:prstGeom>
-            <a:noFill/>
-          </p:spPr>
-          <p:txBody>
-            <a:bodyPr wrap="none" rtlCol="0">
-              <a:spAutoFit/>
-            </a:bodyPr>
-            <a:lstStyle/>
-            <a:p>
-              <a:r>
-                <a:rPr lang="en-GB" sz="1200" dirty="0" err="1" smtClean="0"/>
-                <a:t>aaa</a:t>
-              </a:r>
-              <a:endParaRPr lang="en-GB" sz="1200" dirty="0"/>
-            </a:p>
-          </p:txBody>
-        </p:sp>
-        <p:sp>
-          <p:nvSpPr>
-            <p:cNvPr id="67" name="TextBox 66"/>
-            <p:cNvSpPr txBox="1"/>
-            <p:nvPr/>
-          </p:nvSpPr>
-          <p:spPr>
-            <a:xfrm>
-              <a:off x="-684584" y="2710876"/>
-              <a:ext cx="405880" cy="276999"/>
-            </a:xfrm>
-            <a:prstGeom prst="rect">
-              <a:avLst/>
-            </a:prstGeom>
-            <a:noFill/>
-          </p:spPr>
-          <p:txBody>
-            <a:bodyPr wrap="none" rtlCol="0">
-              <a:spAutoFit/>
-            </a:bodyPr>
-            <a:lstStyle/>
-            <a:p>
-              <a:r>
-                <a:rPr lang="en-GB" sz="1200" dirty="0" err="1" smtClean="0"/>
-                <a:t>aaa</a:t>
-              </a:r>
-              <a:endParaRPr lang="en-GB" sz="1200" dirty="0"/>
-            </a:p>
-          </p:txBody>
-        </p:sp>
-        <p:sp>
-          <p:nvSpPr>
-            <p:cNvPr id="68" name="TextBox 67"/>
-            <p:cNvSpPr txBox="1"/>
-            <p:nvPr/>
-          </p:nvSpPr>
-          <p:spPr>
-            <a:xfrm>
-              <a:off x="-684584" y="2888664"/>
-              <a:ext cx="405880" cy="276999"/>
-            </a:xfrm>
-            <a:prstGeom prst="rect">
-              <a:avLst/>
-            </a:prstGeom>
-            <a:noFill/>
-          </p:spPr>
-          <p:txBody>
-            <a:bodyPr wrap="none" rtlCol="0">
-              <a:spAutoFit/>
-            </a:bodyPr>
-            <a:lstStyle/>
-            <a:p>
-              <a:r>
-                <a:rPr lang="en-GB" sz="1200" dirty="0" err="1" smtClean="0"/>
-                <a:t>aaa</a:t>
-              </a:r>
-              <a:endParaRPr lang="en-GB" sz="1200" dirty="0"/>
-            </a:p>
-          </p:txBody>
-        </p:sp>
-        <p:sp>
-          <p:nvSpPr>
-            <p:cNvPr id="69" name="TextBox 68"/>
-            <p:cNvSpPr txBox="1"/>
-            <p:nvPr/>
-          </p:nvSpPr>
-          <p:spPr>
-            <a:xfrm>
-              <a:off x="-684584" y="3066452"/>
-              <a:ext cx="405880" cy="276999"/>
-            </a:xfrm>
-            <a:prstGeom prst="rect">
-              <a:avLst/>
-            </a:prstGeom>
-            <a:noFill/>
-          </p:spPr>
-          <p:txBody>
-            <a:bodyPr wrap="none" rtlCol="0">
-              <a:spAutoFit/>
-            </a:bodyPr>
-            <a:lstStyle/>
-            <a:p>
-              <a:r>
-                <a:rPr lang="en-GB" sz="1200" dirty="0" err="1" smtClean="0"/>
-                <a:t>aaa</a:t>
-              </a:r>
-              <a:endParaRPr lang="en-GB" sz="1200" dirty="0"/>
-            </a:p>
-          </p:txBody>
-        </p:sp>
-        <p:sp>
-          <p:nvSpPr>
-            <p:cNvPr id="70" name="TextBox 69"/>
-            <p:cNvSpPr txBox="1"/>
-            <p:nvPr/>
-          </p:nvSpPr>
-          <p:spPr>
-            <a:xfrm>
-              <a:off x="-684584" y="3244240"/>
-              <a:ext cx="405880" cy="276999"/>
-            </a:xfrm>
-            <a:prstGeom prst="rect">
-              <a:avLst/>
-            </a:prstGeom>
-            <a:noFill/>
-          </p:spPr>
-          <p:txBody>
-            <a:bodyPr wrap="none" rtlCol="0">
-              <a:spAutoFit/>
-            </a:bodyPr>
-            <a:lstStyle/>
-            <a:p>
-              <a:r>
-                <a:rPr lang="en-GB" sz="1200" dirty="0" err="1" smtClean="0"/>
-                <a:t>aaa</a:t>
-              </a:r>
-              <a:endParaRPr lang="en-GB" sz="1200" dirty="0"/>
-            </a:p>
-          </p:txBody>
-        </p:sp>
-        <p:sp>
-          <p:nvSpPr>
-            <p:cNvPr id="71" name="TextBox 70"/>
-            <p:cNvSpPr txBox="1"/>
-            <p:nvPr/>
-          </p:nvSpPr>
-          <p:spPr>
-            <a:xfrm>
-              <a:off x="-684584" y="3422028"/>
-              <a:ext cx="405880" cy="276999"/>
-            </a:xfrm>
-            <a:prstGeom prst="rect">
-              <a:avLst/>
-            </a:prstGeom>
-            <a:noFill/>
-          </p:spPr>
-          <p:txBody>
-            <a:bodyPr wrap="none" rtlCol="0">
-              <a:spAutoFit/>
-            </a:bodyPr>
-            <a:lstStyle/>
-            <a:p>
-              <a:r>
-                <a:rPr lang="en-GB" sz="1200" dirty="0" err="1" smtClean="0"/>
-                <a:t>aaa</a:t>
-              </a:r>
-              <a:endParaRPr lang="en-GB" sz="1200" dirty="0"/>
-            </a:p>
-          </p:txBody>
-        </p:sp>
-        <p:sp>
-          <p:nvSpPr>
-            <p:cNvPr id="72" name="TextBox 71"/>
-            <p:cNvSpPr txBox="1"/>
-            <p:nvPr/>
-          </p:nvSpPr>
-          <p:spPr>
-            <a:xfrm>
-              <a:off x="-684584" y="3599816"/>
-              <a:ext cx="405880" cy="276999"/>
-            </a:xfrm>
-            <a:prstGeom prst="rect">
-              <a:avLst/>
-            </a:prstGeom>
-            <a:noFill/>
-          </p:spPr>
-          <p:txBody>
-            <a:bodyPr wrap="none" rtlCol="0">
-              <a:spAutoFit/>
-            </a:bodyPr>
-            <a:lstStyle/>
-            <a:p>
-              <a:r>
-                <a:rPr lang="en-GB" sz="1200" dirty="0" err="1" smtClean="0"/>
-                <a:t>aaa</a:t>
-              </a:r>
-              <a:endParaRPr lang="en-GB" sz="1200" dirty="0"/>
-            </a:p>
-          </p:txBody>
-        </p:sp>
-        <p:sp>
-          <p:nvSpPr>
-            <p:cNvPr id="93" name="TextBox 92"/>
-            <p:cNvSpPr txBox="1"/>
-            <p:nvPr/>
-          </p:nvSpPr>
-          <p:spPr>
-            <a:xfrm>
-              <a:off x="-684584" y="3777604"/>
-              <a:ext cx="405880" cy="276999"/>
-            </a:xfrm>
-            <a:prstGeom prst="rect">
-              <a:avLst/>
-            </a:prstGeom>
-            <a:noFill/>
-          </p:spPr>
-          <p:txBody>
-            <a:bodyPr wrap="none" rtlCol="0">
-              <a:spAutoFit/>
-            </a:bodyPr>
-            <a:lstStyle/>
-            <a:p>
-              <a:r>
-                <a:rPr lang="en-GB" sz="1200" dirty="0" err="1" smtClean="0"/>
-                <a:t>aaa</a:t>
-              </a:r>
-              <a:endParaRPr lang="en-GB" sz="1200" dirty="0"/>
-            </a:p>
-          </p:txBody>
-        </p:sp>
-        <p:sp>
-          <p:nvSpPr>
-            <p:cNvPr id="94" name="TextBox 93"/>
-            <p:cNvSpPr txBox="1"/>
-            <p:nvPr/>
-          </p:nvSpPr>
-          <p:spPr>
-            <a:xfrm>
-              <a:off x="-684584" y="3955392"/>
-              <a:ext cx="405880" cy="276999"/>
-            </a:xfrm>
-            <a:prstGeom prst="rect">
-              <a:avLst/>
-            </a:prstGeom>
-            <a:noFill/>
-          </p:spPr>
-          <p:txBody>
-            <a:bodyPr wrap="none" rtlCol="0">
-              <a:spAutoFit/>
-            </a:bodyPr>
-            <a:lstStyle/>
-            <a:p>
-              <a:r>
-                <a:rPr lang="en-GB" sz="1200" dirty="0" err="1" smtClean="0"/>
-                <a:t>aaa</a:t>
-              </a:r>
-              <a:endParaRPr lang="en-GB" sz="1200" dirty="0"/>
-            </a:p>
-          </p:txBody>
-        </p:sp>
-        <p:sp>
-          <p:nvSpPr>
-            <p:cNvPr id="95" name="TextBox 94"/>
-            <p:cNvSpPr txBox="1"/>
-            <p:nvPr/>
-          </p:nvSpPr>
-          <p:spPr>
-            <a:xfrm>
-              <a:off x="-684584" y="4133180"/>
-              <a:ext cx="405880" cy="276999"/>
-            </a:xfrm>
-            <a:prstGeom prst="rect">
-              <a:avLst/>
-            </a:prstGeom>
-            <a:noFill/>
-          </p:spPr>
-          <p:txBody>
-            <a:bodyPr wrap="none" rtlCol="0">
-              <a:spAutoFit/>
-            </a:bodyPr>
-            <a:lstStyle/>
-            <a:p>
-              <a:r>
-                <a:rPr lang="en-GB" sz="1200" dirty="0" err="1" smtClean="0"/>
-                <a:t>aaa</a:t>
-              </a:r>
-              <a:endParaRPr lang="en-GB" sz="1200" dirty="0"/>
-            </a:p>
-          </p:txBody>
-        </p:sp>
-        <p:sp>
-          <p:nvSpPr>
-            <p:cNvPr id="96" name="TextBox 95"/>
-            <p:cNvSpPr txBox="1"/>
-            <p:nvPr/>
-          </p:nvSpPr>
-          <p:spPr>
-            <a:xfrm>
-              <a:off x="-684584" y="4310975"/>
-              <a:ext cx="405880" cy="276999"/>
-            </a:xfrm>
-            <a:prstGeom prst="rect">
-              <a:avLst/>
-            </a:prstGeom>
-            <a:noFill/>
-          </p:spPr>
-          <p:txBody>
-            <a:bodyPr wrap="none" rtlCol="0">
-              <a:spAutoFit/>
-            </a:bodyPr>
-            <a:lstStyle/>
-            <a:p>
-              <a:r>
-                <a:rPr lang="en-GB" sz="1200" dirty="0" err="1" smtClean="0"/>
-                <a:t>aaa</a:t>
-              </a:r>
-              <a:endParaRPr lang="en-GB" sz="1200" dirty="0"/>
-            </a:p>
-          </p:txBody>
-        </p:sp>
-      </p:grpSp>
-      <p:grpSp>
-        <p:nvGrpSpPr>
           <p:cNvPr id="128" name="Group 127"/>
           <p:cNvGrpSpPr/>
           <p:nvPr/>
@@ -11625,6 +11029,174 @@
                 <a:srgbClr val="FF0000"/>
               </a:solidFill>
             </a:endParaRPr>
+          </a:p>
+        </p:txBody>
+      </p:sp>
+      <p:sp>
+        <p:nvSpPr>
+          <p:cNvPr id="3" name="Oval 2"/>
+          <p:cNvSpPr/>
+          <p:nvPr/>
+        </p:nvSpPr>
+        <p:spPr>
+          <a:xfrm>
+            <a:off x="1146845" y="1832794"/>
+            <a:ext cx="174768" cy="174768"/>
+          </a:xfrm>
+          <a:prstGeom prst="ellipse">
+            <a:avLst/>
+          </a:prstGeom>
+        </p:spPr>
+        <p:style>
+          <a:lnRef idx="1">
+            <a:schemeClr val="accent3"/>
+          </a:lnRef>
+          <a:fillRef idx="2">
+            <a:schemeClr val="accent3"/>
+          </a:fillRef>
+          <a:effectRef idx="1">
+            <a:schemeClr val="accent3"/>
+          </a:effectRef>
+          <a:fontRef idx="minor">
+            <a:schemeClr val="dk1"/>
+          </a:fontRef>
+        </p:style>
+        <p:txBody>
+          <a:bodyPr rtlCol="0" anchor="ctr"/>
+          <a:lstStyle/>
+          <a:p>
+            <a:pPr algn="ctr"/>
+            <a:r>
+              <a:rPr lang="en-SG" sz="1200" dirty="0" smtClean="0"/>
+              <a:t>1</a:t>
+            </a:r>
+            <a:endParaRPr lang="en-SG" sz="1200" dirty="0"/>
+          </a:p>
+        </p:txBody>
+      </p:sp>
+      <p:sp>
+        <p:nvSpPr>
+          <p:cNvPr id="125" name="Oval 124"/>
+          <p:cNvSpPr/>
+          <p:nvPr/>
+        </p:nvSpPr>
+        <p:spPr>
+          <a:xfrm>
+            <a:off x="1578595" y="2193424"/>
+            <a:ext cx="174768" cy="174768"/>
+          </a:xfrm>
+          <a:prstGeom prst="ellipse">
+            <a:avLst/>
+          </a:prstGeom>
+        </p:spPr>
+        <p:style>
+          <a:lnRef idx="1">
+            <a:schemeClr val="accent3"/>
+          </a:lnRef>
+          <a:fillRef idx="2">
+            <a:schemeClr val="accent3"/>
+          </a:fillRef>
+          <a:effectRef idx="1">
+            <a:schemeClr val="accent3"/>
+          </a:effectRef>
+          <a:fontRef idx="minor">
+            <a:schemeClr val="dk1"/>
+          </a:fontRef>
+        </p:style>
+        <p:txBody>
+          <a:bodyPr rtlCol="0" anchor="ctr"/>
+          <a:lstStyle/>
+          <a:p>
+            <a:pPr algn="ctr"/>
+            <a:r>
+              <a:rPr lang="en-SG" sz="1200" dirty="0" smtClean="0"/>
+              <a:t>2</a:t>
+            </a:r>
+            <a:endParaRPr lang="en-SG" sz="1200" dirty="0"/>
+          </a:p>
+        </p:txBody>
+      </p:sp>
+      <p:sp>
+        <p:nvSpPr>
+          <p:cNvPr id="126" name="Oval 125"/>
+          <p:cNvSpPr/>
+          <p:nvPr/>
+        </p:nvSpPr>
+        <p:spPr>
+          <a:xfrm>
+            <a:off x="2988195" y="3624535"/>
+            <a:ext cx="174768" cy="174768"/>
+          </a:xfrm>
+          <a:prstGeom prst="ellipse">
+            <a:avLst/>
+          </a:prstGeom>
+        </p:spPr>
+        <p:style>
+          <a:lnRef idx="1">
+            <a:schemeClr val="accent3"/>
+          </a:lnRef>
+          <a:fillRef idx="2">
+            <a:schemeClr val="accent3"/>
+          </a:fillRef>
+          <a:effectRef idx="1">
+            <a:schemeClr val="accent3"/>
+          </a:effectRef>
+          <a:fontRef idx="minor">
+            <a:schemeClr val="dk1"/>
+          </a:fontRef>
+        </p:style>
+        <p:txBody>
+          <a:bodyPr rtlCol="0" anchor="ctr"/>
+          <a:lstStyle/>
+          <a:p>
+            <a:pPr algn="ctr"/>
+            <a:r>
+              <a:rPr lang="en-SG" sz="1200" dirty="0" smtClean="0"/>
+              <a:t>3</a:t>
+            </a:r>
+            <a:endParaRPr lang="en-SG" sz="1200" dirty="0"/>
+          </a:p>
+        </p:txBody>
+      </p:sp>
+      <p:sp>
+        <p:nvSpPr>
+          <p:cNvPr id="127" name="Oval 126"/>
+          <p:cNvSpPr/>
+          <p:nvPr/>
+        </p:nvSpPr>
+        <p:spPr>
+          <a:xfrm>
+            <a:off x="4955240" y="2886609"/>
+            <a:ext cx="174768" cy="174768"/>
+          </a:xfrm>
+          <a:prstGeom prst="ellipse">
+            <a:avLst/>
+          </a:prstGeom>
+        </p:spPr>
+        <p:style>
+          <a:lnRef idx="1">
+            <a:schemeClr val="accent3"/>
+          </a:lnRef>
+          <a:fillRef idx="2">
+            <a:schemeClr val="accent3"/>
+          </a:fillRef>
+          <a:effectRef idx="1">
+            <a:schemeClr val="accent3"/>
+          </a:effectRef>
+          <a:fontRef idx="minor">
+            <a:schemeClr val="dk1"/>
+          </a:fontRef>
+        </p:style>
+        <p:txBody>
+          <a:bodyPr rtlCol="0" anchor="ctr"/>
+          <a:lstStyle/>
+          <a:p>
+            <a:pPr algn="ctr"/>
+            <a:r>
+              <a:rPr lang="en-SG" sz="1200" dirty="0" smtClean="0"/>
+              <a:t>4</a:t>
+            </a:r>
+            <a:endParaRPr lang="en-SG" sz="1200" dirty="0"/>
           </a:p>
         </p:txBody>
       </p:sp>
@@ -15487,6 +15059,132 @@
           </a:p>
         </p:txBody>
       </p:sp>
+      <p:sp>
+        <p:nvSpPr>
+          <p:cNvPr id="201" name="Oval 200"/>
+          <p:cNvSpPr/>
+          <p:nvPr/>
+        </p:nvSpPr>
+        <p:spPr>
+          <a:xfrm>
+            <a:off x="1578595" y="2067694"/>
+            <a:ext cx="174768" cy="174768"/>
+          </a:xfrm>
+          <a:prstGeom prst="ellipse">
+            <a:avLst/>
+          </a:prstGeom>
+        </p:spPr>
+        <p:style>
+          <a:lnRef idx="1">
+            <a:schemeClr val="accent3"/>
+          </a:lnRef>
+          <a:fillRef idx="2">
+            <a:schemeClr val="accent3"/>
+          </a:fillRef>
+          <a:effectRef idx="1">
+            <a:schemeClr val="accent3"/>
+          </a:effectRef>
+          <a:fontRef idx="minor">
+            <a:schemeClr val="dk1"/>
+          </a:fontRef>
+        </p:style>
+        <p:txBody>
+          <a:bodyPr rtlCol="0" anchor="ctr"/>
+          <a:lstStyle/>
+          <a:p>
+            <a:pPr algn="ctr"/>
+            <a:r>
+              <a:rPr lang="en-SG" sz="1200" dirty="0"/>
+              <a:t>1</a:t>
+            </a:r>
+            <a:endParaRPr lang="en-SG" sz="1200" dirty="0"/>
+          </a:p>
+        </p:txBody>
+      </p:sp>
+      <p:sp>
+        <p:nvSpPr>
+          <p:cNvPr id="203" name="Oval 202"/>
+          <p:cNvSpPr/>
+          <p:nvPr/>
+        </p:nvSpPr>
+        <p:spPr>
+          <a:xfrm>
+            <a:off x="3389120" y="3765134"/>
+            <a:ext cx="174768" cy="174768"/>
+          </a:xfrm>
+          <a:prstGeom prst="ellipse">
+            <a:avLst/>
+          </a:prstGeom>
+        </p:spPr>
+        <p:style>
+          <a:lnRef idx="1">
+            <a:schemeClr val="accent3"/>
+          </a:lnRef>
+          <a:fillRef idx="2">
+            <a:schemeClr val="accent3"/>
+          </a:fillRef>
+          <a:effectRef idx="1">
+            <a:schemeClr val="accent3"/>
+          </a:effectRef>
+          <a:fontRef idx="minor">
+            <a:schemeClr val="dk1"/>
+          </a:fontRef>
+        </p:style>
+        <p:txBody>
+          <a:bodyPr rtlCol="0" anchor="ctr"/>
+          <a:lstStyle/>
+          <a:p>
+            <a:pPr algn="ctr"/>
+            <a:r>
+              <a:rPr lang="en-SG" sz="1200" dirty="0"/>
+              <a:t>2</a:t>
+            </a:r>
+            <a:endParaRPr lang="en-SG" sz="1200" dirty="0"/>
+          </a:p>
+        </p:txBody>
+      </p:sp>
+      <p:sp>
+        <p:nvSpPr>
+          <p:cNvPr id="204" name="Oval 203"/>
+          <p:cNvSpPr/>
+          <p:nvPr/>
+        </p:nvSpPr>
+        <p:spPr>
+          <a:xfrm>
+            <a:off x="5261328" y="3045054"/>
+            <a:ext cx="174768" cy="174768"/>
+          </a:xfrm>
+          <a:prstGeom prst="ellipse">
+            <a:avLst/>
+          </a:prstGeom>
+        </p:spPr>
+        <p:style>
+          <a:lnRef idx="1">
+            <a:schemeClr val="accent3"/>
+          </a:lnRef>
+          <a:fillRef idx="2">
+            <a:schemeClr val="accent3"/>
+          </a:fillRef>
+          <a:effectRef idx="1">
+            <a:schemeClr val="accent3"/>
+          </a:effectRef>
+          <a:fontRef idx="minor">
+            <a:schemeClr val="dk1"/>
+          </a:fontRef>
+        </p:style>
+        <p:txBody>
+          <a:bodyPr rtlCol="0" anchor="ctr"/>
+          <a:lstStyle/>
+          <a:p>
+            <a:pPr algn="ctr"/>
+            <a:r>
+              <a:rPr lang="en-SG" sz="1200" dirty="0"/>
+              <a:t>3</a:t>
+            </a:r>
+            <a:endParaRPr lang="en-SG" sz="1200" dirty="0"/>
+          </a:p>
+        </p:txBody>
+      </p:sp>
     </p:spTree>
     <p:extLst>
       <p:ext uri="{BB962C8B-B14F-4D97-AF65-F5344CB8AC3E}">
@@ -16911,9 +16609,9 @@
           <p:nvPr/>
         </p:nvCxnSpPr>
         <p:spPr>
-          <a:xfrm>
-            <a:off x="4467135" y="1797703"/>
-            <a:ext cx="309608" cy="1708199"/>
+          <a:xfrm flipH="1">
+            <a:off x="4776743" y="897253"/>
+            <a:ext cx="106734" cy="2608649"/>
           </a:xfrm>
           <a:prstGeom prst="straightConnector1">
             <a:avLst/>
@@ -18210,6 +17908,638 @@
           </a:fontRef>
         </p:style>
       </p:cxnSp>
+      <p:sp>
+        <p:nvSpPr>
+          <p:cNvPr id="79" name="Oval 78"/>
+          <p:cNvSpPr/>
+          <p:nvPr/>
+        </p:nvSpPr>
+        <p:spPr>
+          <a:xfrm>
+            <a:off x="6277562" y="810826"/>
+            <a:ext cx="174768" cy="174768"/>
+          </a:xfrm>
+          <a:prstGeom prst="ellipse">
+            <a:avLst/>
+          </a:prstGeom>
+        </p:spPr>
+        <p:style>
+          <a:lnRef idx="1">
+            <a:schemeClr val="accent3"/>
+          </a:lnRef>
+          <a:fillRef idx="2">
+            <a:schemeClr val="accent3"/>
+          </a:fillRef>
+          <a:effectRef idx="1">
+            <a:schemeClr val="accent3"/>
+          </a:effectRef>
+          <a:fontRef idx="minor">
+            <a:schemeClr val="dk1"/>
+          </a:fontRef>
+        </p:style>
+        <p:txBody>
+          <a:bodyPr rtlCol="0" anchor="ctr"/>
+          <a:lstStyle/>
+          <a:p>
+            <a:pPr algn="ctr"/>
+            <a:r>
+              <a:rPr lang="en-SG" sz="1200" dirty="0" smtClean="0"/>
+              <a:t>1</a:t>
+            </a:r>
+            <a:endParaRPr lang="en-SG" sz="1200" dirty="0"/>
+          </a:p>
+        </p:txBody>
+      </p:sp>
+      <p:sp>
+        <p:nvSpPr>
+          <p:cNvPr id="82" name="Oval 81"/>
+          <p:cNvSpPr/>
+          <p:nvPr/>
+        </p:nvSpPr>
+        <p:spPr>
+          <a:xfrm>
+            <a:off x="4775040" y="809869"/>
+            <a:ext cx="174768" cy="174768"/>
+          </a:xfrm>
+          <a:prstGeom prst="ellipse">
+            <a:avLst/>
+          </a:prstGeom>
+        </p:spPr>
+        <p:style>
+          <a:lnRef idx="1">
+            <a:schemeClr val="accent3"/>
+          </a:lnRef>
+          <a:fillRef idx="2">
+            <a:schemeClr val="accent3"/>
+          </a:fillRef>
+          <a:effectRef idx="1">
+            <a:schemeClr val="accent3"/>
+          </a:effectRef>
+          <a:fontRef idx="minor">
+            <a:schemeClr val="dk1"/>
+          </a:fontRef>
+        </p:style>
+        <p:txBody>
+          <a:bodyPr rtlCol="0" anchor="ctr"/>
+          <a:lstStyle/>
+          <a:p>
+            <a:pPr algn="ctr"/>
+            <a:r>
+              <a:rPr lang="en-SG" sz="1200" dirty="0" smtClean="0"/>
+              <a:t>2</a:t>
+            </a:r>
+            <a:endParaRPr lang="en-SG" sz="1200" dirty="0"/>
+          </a:p>
+        </p:txBody>
+      </p:sp>
+      <p:sp>
+        <p:nvSpPr>
+          <p:cNvPr id="85" name="Oval 84"/>
+          <p:cNvSpPr/>
+          <p:nvPr/>
+        </p:nvSpPr>
+        <p:spPr>
+          <a:xfrm>
+            <a:off x="1811206" y="1570210"/>
+            <a:ext cx="174768" cy="569492"/>
+          </a:xfrm>
+          <a:prstGeom prst="ellipse">
+            <a:avLst/>
+          </a:prstGeom>
+        </p:spPr>
+        <p:style>
+          <a:lnRef idx="1">
+            <a:schemeClr val="accent3"/>
+          </a:lnRef>
+          <a:fillRef idx="2">
+            <a:schemeClr val="accent3"/>
+          </a:fillRef>
+          <a:effectRef idx="1">
+            <a:schemeClr val="accent3"/>
+          </a:effectRef>
+          <a:fontRef idx="minor">
+            <a:schemeClr val="dk1"/>
+          </a:fontRef>
+        </p:style>
+        <p:txBody>
+          <a:bodyPr rtlCol="0" anchor="ctr"/>
+          <a:lstStyle/>
+          <a:p>
+            <a:pPr algn="ctr"/>
+            <a:r>
+              <a:rPr lang="en-SG" sz="1200" dirty="0" smtClean="0"/>
+              <a:t>4</a:t>
+            </a:r>
+            <a:endParaRPr lang="en-SG" sz="1200" dirty="0"/>
+          </a:p>
+        </p:txBody>
+      </p:sp>
+      <p:sp>
+        <p:nvSpPr>
+          <p:cNvPr id="86" name="Oval 85"/>
+          <p:cNvSpPr/>
+          <p:nvPr/>
+        </p:nvSpPr>
+        <p:spPr>
+          <a:xfrm>
+            <a:off x="4567469" y="1282080"/>
+            <a:ext cx="174768" cy="174768"/>
+          </a:xfrm>
+          <a:prstGeom prst="ellipse">
+            <a:avLst/>
+          </a:prstGeom>
+        </p:spPr>
+        <p:style>
+          <a:lnRef idx="1">
+            <a:schemeClr val="accent3"/>
+          </a:lnRef>
+          <a:fillRef idx="2">
+            <a:schemeClr val="accent3"/>
+          </a:fillRef>
+          <a:effectRef idx="1">
+            <a:schemeClr val="accent3"/>
+          </a:effectRef>
+          <a:fontRef idx="minor">
+            <a:schemeClr val="dk1"/>
+          </a:fontRef>
+        </p:style>
+        <p:txBody>
+          <a:bodyPr rtlCol="0" anchor="ctr"/>
+          <a:lstStyle/>
+          <a:p>
+            <a:pPr algn="ctr"/>
+            <a:r>
+              <a:rPr lang="en-SG" sz="1200" dirty="0" smtClean="0"/>
+              <a:t>5</a:t>
+            </a:r>
+            <a:endParaRPr lang="en-SG" sz="1200" dirty="0"/>
+          </a:p>
+        </p:txBody>
+      </p:sp>
+      <p:sp>
+        <p:nvSpPr>
+          <p:cNvPr id="88" name="Oval 87"/>
+          <p:cNvSpPr/>
+          <p:nvPr/>
+        </p:nvSpPr>
+        <p:spPr>
+          <a:xfrm>
+            <a:off x="6521639" y="1059947"/>
+            <a:ext cx="475537" cy="174768"/>
+          </a:xfrm>
+          <a:prstGeom prst="ellipse">
+            <a:avLst/>
+          </a:prstGeom>
+        </p:spPr>
+        <p:style>
+          <a:lnRef idx="1">
+            <a:schemeClr val="accent3"/>
+          </a:lnRef>
+          <a:fillRef idx="2">
+            <a:schemeClr val="accent3"/>
+          </a:fillRef>
+          <a:effectRef idx="1">
+            <a:schemeClr val="accent3"/>
+          </a:effectRef>
+          <a:fontRef idx="minor">
+            <a:schemeClr val="dk1"/>
+          </a:fontRef>
+        </p:style>
+        <p:txBody>
+          <a:bodyPr rtlCol="0" anchor="ctr"/>
+          <a:lstStyle/>
+          <a:p>
+            <a:pPr algn="ctr"/>
+            <a:r>
+              <a:rPr lang="en-SG" sz="1200" dirty="0" smtClean="0"/>
+              <a:t>6a</a:t>
+            </a:r>
+            <a:endParaRPr lang="en-SG" sz="1200" dirty="0"/>
+          </a:p>
+        </p:txBody>
+      </p:sp>
+      <p:sp>
+        <p:nvSpPr>
+          <p:cNvPr id="89" name="Oval 88"/>
+          <p:cNvSpPr/>
+          <p:nvPr/>
+        </p:nvSpPr>
+        <p:spPr>
+          <a:xfrm>
+            <a:off x="4597580" y="1734976"/>
+            <a:ext cx="174768" cy="174768"/>
+          </a:xfrm>
+          <a:prstGeom prst="ellipse">
+            <a:avLst/>
+          </a:prstGeom>
+        </p:spPr>
+        <p:style>
+          <a:lnRef idx="1">
+            <a:schemeClr val="accent3"/>
+          </a:lnRef>
+          <a:fillRef idx="2">
+            <a:schemeClr val="accent3"/>
+          </a:fillRef>
+          <a:effectRef idx="1">
+            <a:schemeClr val="accent3"/>
+          </a:effectRef>
+          <a:fontRef idx="minor">
+            <a:schemeClr val="dk1"/>
+          </a:fontRef>
+        </p:style>
+        <p:txBody>
+          <a:bodyPr rtlCol="0" anchor="ctr"/>
+          <a:lstStyle/>
+          <a:p>
+            <a:pPr algn="ctr"/>
+            <a:r>
+              <a:rPr lang="en-SG" sz="1200" dirty="0" smtClean="0"/>
+              <a:t>5</a:t>
+            </a:r>
+            <a:endParaRPr lang="en-SG" sz="1200" dirty="0"/>
+          </a:p>
+        </p:txBody>
+      </p:sp>
+      <p:sp>
+        <p:nvSpPr>
+          <p:cNvPr id="91" name="Oval 90"/>
+          <p:cNvSpPr/>
+          <p:nvPr/>
+        </p:nvSpPr>
+        <p:spPr>
+          <a:xfrm>
+            <a:off x="6407848" y="2052318"/>
+            <a:ext cx="504056" cy="174768"/>
+          </a:xfrm>
+          <a:prstGeom prst="ellipse">
+            <a:avLst/>
+          </a:prstGeom>
+        </p:spPr>
+        <p:style>
+          <a:lnRef idx="1">
+            <a:schemeClr val="accent3"/>
+          </a:lnRef>
+          <a:fillRef idx="2">
+            <a:schemeClr val="accent3"/>
+          </a:fillRef>
+          <a:effectRef idx="1">
+            <a:schemeClr val="accent3"/>
+          </a:effectRef>
+          <a:fontRef idx="minor">
+            <a:schemeClr val="dk1"/>
+          </a:fontRef>
+        </p:style>
+        <p:txBody>
+          <a:bodyPr rtlCol="0" anchor="ctr"/>
+          <a:lstStyle/>
+          <a:p>
+            <a:pPr algn="ctr"/>
+            <a:r>
+              <a:rPr lang="en-SG" sz="1200" dirty="0" smtClean="0"/>
+              <a:t>6b</a:t>
+            </a:r>
+            <a:endParaRPr lang="en-SG" sz="1200" dirty="0"/>
+          </a:p>
+        </p:txBody>
+      </p:sp>
+      <p:sp>
+        <p:nvSpPr>
+          <p:cNvPr id="92" name="Oval 91"/>
+          <p:cNvSpPr/>
+          <p:nvPr/>
+        </p:nvSpPr>
+        <p:spPr>
+          <a:xfrm>
+            <a:off x="3819541" y="2126341"/>
+            <a:ext cx="475537" cy="174768"/>
+          </a:xfrm>
+          <a:prstGeom prst="ellipse">
+            <a:avLst/>
+          </a:prstGeom>
+        </p:spPr>
+        <p:style>
+          <a:lnRef idx="1">
+            <a:schemeClr val="accent3"/>
+          </a:lnRef>
+          <a:fillRef idx="2">
+            <a:schemeClr val="accent3"/>
+          </a:fillRef>
+          <a:effectRef idx="1">
+            <a:schemeClr val="accent3"/>
+          </a:effectRef>
+          <a:fontRef idx="minor">
+            <a:schemeClr val="dk1"/>
+          </a:fontRef>
+        </p:style>
+        <p:txBody>
+          <a:bodyPr rtlCol="0" anchor="ctr"/>
+          <a:lstStyle/>
+          <a:p>
+            <a:pPr algn="ctr"/>
+            <a:r>
+              <a:rPr lang="en-SG" sz="1200" dirty="0" smtClean="0"/>
+              <a:t>7a</a:t>
+            </a:r>
+            <a:endParaRPr lang="en-SG" sz="1200" dirty="0"/>
+          </a:p>
+        </p:txBody>
+      </p:sp>
+      <p:sp>
+        <p:nvSpPr>
+          <p:cNvPr id="93" name="Oval 92"/>
+          <p:cNvSpPr/>
+          <p:nvPr/>
+        </p:nvSpPr>
+        <p:spPr>
+          <a:xfrm>
+            <a:off x="3707904" y="2634219"/>
+            <a:ext cx="504056" cy="174768"/>
+          </a:xfrm>
+          <a:prstGeom prst="ellipse">
+            <a:avLst/>
+          </a:prstGeom>
+        </p:spPr>
+        <p:style>
+          <a:lnRef idx="1">
+            <a:schemeClr val="accent3"/>
+          </a:lnRef>
+          <a:fillRef idx="2">
+            <a:schemeClr val="accent3"/>
+          </a:fillRef>
+          <a:effectRef idx="1">
+            <a:schemeClr val="accent3"/>
+          </a:effectRef>
+          <a:fontRef idx="minor">
+            <a:schemeClr val="dk1"/>
+          </a:fontRef>
+        </p:style>
+        <p:txBody>
+          <a:bodyPr rtlCol="0" anchor="ctr"/>
+          <a:lstStyle/>
+          <a:p>
+            <a:pPr algn="ctr"/>
+            <a:r>
+              <a:rPr lang="en-SG" sz="1200" dirty="0" smtClean="0"/>
+              <a:t>7b</a:t>
+            </a:r>
+            <a:endParaRPr lang="en-SG" sz="1200" dirty="0"/>
+          </a:p>
+        </p:txBody>
+      </p:sp>
+      <p:sp>
+        <p:nvSpPr>
+          <p:cNvPr id="95" name="Oval 94"/>
+          <p:cNvSpPr/>
+          <p:nvPr/>
+        </p:nvSpPr>
+        <p:spPr>
+          <a:xfrm>
+            <a:off x="6520422" y="3261078"/>
+            <a:ext cx="174768" cy="174768"/>
+          </a:xfrm>
+          <a:prstGeom prst="ellipse">
+            <a:avLst/>
+          </a:prstGeom>
+        </p:spPr>
+        <p:style>
+          <a:lnRef idx="1">
+            <a:schemeClr val="accent3"/>
+          </a:lnRef>
+          <a:fillRef idx="2">
+            <a:schemeClr val="accent3"/>
+          </a:fillRef>
+          <a:effectRef idx="1">
+            <a:schemeClr val="accent3"/>
+          </a:effectRef>
+          <a:fontRef idx="minor">
+            <a:schemeClr val="dk1"/>
+          </a:fontRef>
+        </p:style>
+        <p:txBody>
+          <a:bodyPr rtlCol="0" anchor="ctr"/>
+          <a:lstStyle/>
+          <a:p>
+            <a:pPr algn="ctr"/>
+            <a:r>
+              <a:rPr lang="en-SG" sz="1200" dirty="0" smtClean="0"/>
+              <a:t>3</a:t>
+            </a:r>
+            <a:endParaRPr lang="en-SG" sz="1200" dirty="0"/>
+          </a:p>
+        </p:txBody>
+      </p:sp>
+      <p:sp>
+        <p:nvSpPr>
+          <p:cNvPr id="96" name="Oval 95"/>
+          <p:cNvSpPr/>
+          <p:nvPr/>
+        </p:nvSpPr>
+        <p:spPr>
+          <a:xfrm>
+            <a:off x="6407848" y="4096618"/>
+            <a:ext cx="504056" cy="174768"/>
+          </a:xfrm>
+          <a:prstGeom prst="ellipse">
+            <a:avLst/>
+          </a:prstGeom>
+        </p:spPr>
+        <p:style>
+          <a:lnRef idx="1">
+            <a:schemeClr val="accent3"/>
+          </a:lnRef>
+          <a:fillRef idx="2">
+            <a:schemeClr val="accent3"/>
+          </a:fillRef>
+          <a:effectRef idx="1">
+            <a:schemeClr val="accent3"/>
+          </a:effectRef>
+          <a:fontRef idx="minor">
+            <a:schemeClr val="dk1"/>
+          </a:fontRef>
+        </p:style>
+        <p:txBody>
+          <a:bodyPr rtlCol="0" anchor="ctr"/>
+          <a:lstStyle/>
+          <a:p>
+            <a:pPr algn="ctr"/>
+            <a:r>
+              <a:rPr lang="en-SG" sz="1200" dirty="0" smtClean="0"/>
+              <a:t>8b</a:t>
+            </a:r>
+            <a:endParaRPr lang="en-SG" sz="1200" dirty="0"/>
+          </a:p>
+        </p:txBody>
+      </p:sp>
+      <p:sp>
+        <p:nvSpPr>
+          <p:cNvPr id="97" name="Oval 96"/>
+          <p:cNvSpPr/>
+          <p:nvPr/>
+        </p:nvSpPr>
+        <p:spPr>
+          <a:xfrm>
+            <a:off x="2360167" y="2787774"/>
+            <a:ext cx="504056" cy="174768"/>
+          </a:xfrm>
+          <a:prstGeom prst="ellipse">
+            <a:avLst/>
+          </a:prstGeom>
+        </p:spPr>
+        <p:style>
+          <a:lnRef idx="1">
+            <a:schemeClr val="accent3"/>
+          </a:lnRef>
+          <a:fillRef idx="2">
+            <a:schemeClr val="accent3"/>
+          </a:fillRef>
+          <a:effectRef idx="1">
+            <a:schemeClr val="accent3"/>
+          </a:effectRef>
+          <a:fontRef idx="minor">
+            <a:schemeClr val="dk1"/>
+          </a:fontRef>
+        </p:style>
+        <p:txBody>
+          <a:bodyPr rtlCol="0" anchor="ctr"/>
+          <a:lstStyle/>
+          <a:p>
+            <a:pPr algn="ctr"/>
+            <a:r>
+              <a:rPr lang="en-SG" sz="1200" dirty="0" smtClean="0"/>
+              <a:t>8b</a:t>
+            </a:r>
+            <a:endParaRPr lang="en-SG" sz="1200" dirty="0"/>
+          </a:p>
+        </p:txBody>
+      </p:sp>
+      <p:sp>
+        <p:nvSpPr>
+          <p:cNvPr id="99" name="Oval 98"/>
+          <p:cNvSpPr/>
+          <p:nvPr/>
+        </p:nvSpPr>
+        <p:spPr>
+          <a:xfrm>
+            <a:off x="6353700" y="3554184"/>
+            <a:ext cx="475537" cy="174768"/>
+          </a:xfrm>
+          <a:prstGeom prst="ellipse">
+            <a:avLst/>
+          </a:prstGeom>
+        </p:spPr>
+        <p:style>
+          <a:lnRef idx="1">
+            <a:schemeClr val="accent3"/>
+          </a:lnRef>
+          <a:fillRef idx="2">
+            <a:schemeClr val="accent3"/>
+          </a:fillRef>
+          <a:effectRef idx="1">
+            <a:schemeClr val="accent3"/>
+          </a:effectRef>
+          <a:fontRef idx="minor">
+            <a:schemeClr val="dk1"/>
+          </a:fontRef>
+        </p:style>
+        <p:txBody>
+          <a:bodyPr rtlCol="0" anchor="ctr"/>
+          <a:lstStyle/>
+          <a:p>
+            <a:pPr algn="ctr"/>
+            <a:r>
+              <a:rPr lang="en-SG" sz="1200" dirty="0" smtClean="0"/>
+              <a:t>8a</a:t>
+            </a:r>
+            <a:endParaRPr lang="en-SG" sz="1200" dirty="0"/>
+          </a:p>
+        </p:txBody>
+      </p:sp>
+      <p:sp>
+        <p:nvSpPr>
+          <p:cNvPr id="100" name="Oval 99"/>
+          <p:cNvSpPr/>
+          <p:nvPr/>
+        </p:nvSpPr>
+        <p:spPr>
+          <a:xfrm>
+            <a:off x="7596336" y="4269190"/>
+            <a:ext cx="504056" cy="174768"/>
+          </a:xfrm>
+          <a:prstGeom prst="ellipse">
+            <a:avLst/>
+          </a:prstGeom>
+        </p:spPr>
+        <p:style>
+          <a:lnRef idx="1">
+            <a:schemeClr val="accent3"/>
+          </a:lnRef>
+          <a:fillRef idx="2">
+            <a:schemeClr val="accent3"/>
+          </a:fillRef>
+          <a:effectRef idx="1">
+            <a:schemeClr val="accent3"/>
+          </a:effectRef>
+          <a:fontRef idx="minor">
+            <a:schemeClr val="dk1"/>
+          </a:fontRef>
+        </p:style>
+        <p:txBody>
+          <a:bodyPr rtlCol="0" anchor="ctr"/>
+          <a:lstStyle/>
+          <a:p>
+            <a:pPr algn="ctr"/>
+            <a:r>
+              <a:rPr lang="en-SG" sz="1200" dirty="0"/>
+              <a:t>9</a:t>
+            </a:r>
+            <a:r>
+              <a:rPr lang="en-SG" sz="1200" dirty="0" smtClean="0"/>
+              <a:t>b</a:t>
+            </a:r>
+            <a:endParaRPr lang="en-SG" sz="1200" dirty="0"/>
+          </a:p>
+        </p:txBody>
+      </p:sp>
+      <p:sp>
+        <p:nvSpPr>
+          <p:cNvPr id="101" name="TextBox 100"/>
+          <p:cNvSpPr txBox="1"/>
+          <p:nvPr/>
+        </p:nvSpPr>
+        <p:spPr>
+          <a:xfrm>
+            <a:off x="4570049" y="4486349"/>
+            <a:ext cx="2378215" cy="461665"/>
+          </a:xfrm>
+          <a:prstGeom prst="rect">
+            <a:avLst/>
+          </a:prstGeom>
+          <a:noFill/>
+        </p:spPr>
+        <p:txBody>
+          <a:bodyPr wrap="none" rtlCol="0">
+            <a:spAutoFit/>
+          </a:bodyPr>
+          <a:lstStyle/>
+          <a:p>
+            <a:r>
+              <a:rPr lang="en-GB" sz="1200" dirty="0" smtClean="0"/>
+              <a:t>Adding data to CSV-File during add </a:t>
+            </a:r>
+          </a:p>
+          <a:p>
+            <a:r>
+              <a:rPr lang="en-GB" sz="1200" dirty="0" smtClean="0"/>
+              <a:t>and update i</a:t>
+            </a:r>
+            <a:r>
+              <a:rPr lang="en-GB" sz="1200" dirty="0" smtClean="0"/>
+              <a:t>s not shown.</a:t>
+            </a:r>
+            <a:endParaRPr lang="en-GB" sz="1200" dirty="0" smtClean="0"/>
+          </a:p>
+        </p:txBody>
+      </p:sp>
     </p:spTree>
     <p:extLst>
       <p:ext uri="{BB962C8B-B14F-4D97-AF65-F5344CB8AC3E}">

</xml_diff>

<commit_message>
Uppdatd Documentation: New, incompatible version in the works
</commit_message>
<xml_diff>
--- a/Design.pptx
+++ b/Design.pptx
@@ -16245,7 +16245,11 @@
           <a:p>
             <a:r>
               <a:rPr lang="en-GB" sz="1200" dirty="0" smtClean="0"/>
-              <a:t>2) Change Data</a:t>
+              <a:t>4) </a:t>
+            </a:r>
+            <a:r>
+              <a:rPr lang="en-GB" sz="1200" dirty="0" smtClean="0"/>
+              <a:t>Change Data</a:t>
             </a:r>
             <a:endParaRPr lang="en-GB" sz="1200" dirty="0"/>
           </a:p>
@@ -16314,7 +16318,11 @@
           <a:p>
             <a:r>
               <a:rPr lang="en-GB" sz="1200" dirty="0" smtClean="0"/>
-              <a:t>3a) Commit Transaction</a:t>
+              <a:t>6a</a:t>
+            </a:r>
+            <a:r>
+              <a:rPr lang="en-GB" sz="1200" dirty="0" smtClean="0"/>
+              <a:t>) Commit Transaction</a:t>
             </a:r>
             <a:endParaRPr lang="en-GB" sz="1200" dirty="0"/>
           </a:p>
@@ -16380,7 +16388,11 @@
           <a:p>
             <a:r>
               <a:rPr lang="en-GB" sz="1200" dirty="0" smtClean="0"/>
-              <a:t>3b) Rollback Transaction</a:t>
+              <a:t>6b</a:t>
+            </a:r>
+            <a:r>
+              <a:rPr lang="en-GB" sz="1200" dirty="0" smtClean="0"/>
+              <a:t>) Rollback Transaction</a:t>
             </a:r>
             <a:endParaRPr lang="en-GB" sz="1200" dirty="0"/>
           </a:p>
@@ -18508,8 +18520,8 @@
         </p:nvSpPr>
         <p:spPr>
           <a:xfrm>
-            <a:off x="4570049" y="4486349"/>
-            <a:ext cx="2378215" cy="461665"/>
+            <a:off x="4911361" y="4486349"/>
+            <a:ext cx="2108911" cy="461665"/>
           </a:xfrm>
           <a:prstGeom prst="rect">
             <a:avLst/>
@@ -18524,13 +18536,17 @@
           <a:p>
             <a:r>
               <a:rPr lang="en-GB" sz="1200" dirty="0" smtClean="0"/>
-              <a:t>Adding data to CSV-File during add </a:t>
+              <a:t>Adding data to CSV-File during </a:t>
             </a:r>
           </a:p>
           <a:p>
             <a:r>
               <a:rPr lang="en-GB" sz="1200" dirty="0" smtClean="0"/>
-              <a:t>and update i</a:t>
+              <a:t>transaction </a:t>
+            </a:r>
+            <a:r>
+              <a:rPr lang="en-GB" sz="1200" dirty="0" smtClean="0"/>
+              <a:t>i</a:t>
             </a:r>
             <a:r>
               <a:rPr lang="en-GB" sz="1200" dirty="0" smtClean="0"/>

</xml_diff>